<commit_message>
HC: updated the pptx
update the pptx on business value
</commit_message>
<xml_diff>
--- a/Presentation/Mid-Project/IRS-Intelligent-Reasoning-Systems-Practice-Module-Mid-Project-Presenation_Grp5.pptx
+++ b/Presentation/Mid-Project/IRS-Intelligent-Reasoning-Systems-Practice-Module-Mid-Project-Presenation_Grp5.pptx
@@ -5,10 +5,10 @@
     <p:sldMasterId id="2147483684" r:id="rId1"/>
   </p:sldMasterIdLst>
   <p:notesMasterIdLst>
-    <p:notesMasterId r:id="rId7"/>
+    <p:notesMasterId r:id="rId8"/>
   </p:notesMasterIdLst>
   <p:handoutMasterIdLst>
-    <p:handoutMasterId r:id="rId8"/>
+    <p:handoutMasterId r:id="rId9"/>
   </p:handoutMasterIdLst>
   <p:sldIdLst>
     <p:sldId id="1382" r:id="rId2"/>
@@ -16,11 +16,12 @@
     <p:sldId id="1347" r:id="rId4"/>
     <p:sldId id="1386" r:id="rId5"/>
     <p:sldId id="1387" r:id="rId6"/>
+    <p:sldId id="1388" r:id="rId7"/>
   </p:sldIdLst>
   <p:sldSz cx="12192000" cy="6858000"/>
   <p:notesSz cx="7099300" cy="10234613"/>
   <p:custDataLst>
-    <p:tags r:id="rId9"/>
+    <p:tags r:id="rId10"/>
   </p:custDataLst>
   <p:defaultTextStyle>
     <a:defPPr>
@@ -222,7 +223,7 @@
             <a:fld id="{43F1A4C9-FB5C-B247-A357-650712A3F0A8}" type="datetimeFigureOut">
               <a:rPr lang="en-US" smtClean="0"/>
               <a:pPr/>
-              <a:t>4/12/2020</a:t>
+              <a:t>4/13/2020</a:t>
             </a:fld>
             <a:endParaRPr lang="en-US"/>
           </a:p>
@@ -389,7 +390,7 @@
             <a:fld id="{EA4960E5-F060-4C88-B1C5-5A6F5890BEF6}" type="datetimeFigureOut">
               <a:rPr lang="en-SG" smtClean="0"/>
               <a:pPr/>
-              <a:t>12/4/2020</a:t>
+              <a:t>13/4/2020</a:t>
             </a:fld>
             <a:endParaRPr lang="en-SG"/>
           </a:p>
@@ -8285,6 +8286,723 @@
                                           <p:spTgt spid="3">
                                             <p:txEl>
                                               <p:pRg st="12" end="12"/>
+                                            </p:txEl>
+                                          </p:spTgt>
+                                        </p:tgtEl>
+                                        <p:attrNameLst>
+                                          <p:attrName>ppt_y</p:attrName>
+                                        </p:attrNameLst>
+                                      </p:cBhvr>
+                                      <p:tavLst>
+                                        <p:tav tm="0">
+                                          <p:val>
+                                            <p:strVal val="#ppt_y+.1"/>
+                                          </p:val>
+                                        </p:tav>
+                                        <p:tav tm="100000">
+                                          <p:val>
+                                            <p:strVal val="#ppt_y"/>
+                                          </p:val>
+                                        </p:tav>
+                                      </p:tavLst>
+                                    </p:anim>
+                                  </p:childTnLst>
+                                </p:cTn>
+                              </p:par>
+                            </p:childTnLst>
+                          </p:cTn>
+                        </p:par>
+                      </p:childTnLst>
+                    </p:cTn>
+                  </p:par>
+                </p:childTnLst>
+              </p:cTn>
+              <p:prevCondLst>
+                <p:cond evt="onPrev" delay="0">
+                  <p:tgtEl>
+                    <p:sldTgt/>
+                  </p:tgtEl>
+                </p:cond>
+              </p:prevCondLst>
+              <p:nextCondLst>
+                <p:cond evt="onNext" delay="0">
+                  <p:tgtEl>
+                    <p:sldTgt/>
+                  </p:tgtEl>
+                </p:cond>
+              </p:nextCondLst>
+            </p:seq>
+          </p:childTnLst>
+        </p:cTn>
+      </p:par>
+    </p:tnLst>
+  </p:timing>
+</p:sld>
+</file>
+
+<file path=ppt/slides/slide6.xml><?xml version="1.0" encoding="utf-8"?>
+<p:sld xmlns:a="http://schemas.openxmlformats.org/drawingml/2006/main" xmlns:r="http://schemas.openxmlformats.org/officeDocument/2006/relationships" xmlns:p="http://schemas.openxmlformats.org/presentationml/2006/main">
+  <p:cSld>
+    <p:spTree>
+      <p:nvGrpSpPr>
+        <p:cNvPr id="1" name=""/>
+        <p:cNvGrpSpPr/>
+        <p:nvPr/>
+      </p:nvGrpSpPr>
+      <p:grpSpPr>
+        <a:xfrm>
+          <a:off x="0" y="0"/>
+          <a:ext cx="0" cy="0"/>
+          <a:chOff x="0" y="0"/>
+          <a:chExt cx="0" cy="0"/>
+        </a:xfrm>
+      </p:grpSpPr>
+      <p:sp>
+        <p:nvSpPr>
+          <p:cNvPr id="2" name="Title 1"/>
+          <p:cNvSpPr>
+            <a:spLocks noGrp="1"/>
+          </p:cNvSpPr>
+          <p:nvPr>
+            <p:ph type="title"/>
+          </p:nvPr>
+        </p:nvSpPr>
+        <p:spPr/>
+        <p:txBody>
+          <a:bodyPr>
+            <a:normAutofit fontScale="90000"/>
+          </a:bodyPr>
+          <a:lstStyle/>
+          <a:p>
+            <a:r>
+              <a:rPr lang="en-US" dirty="0"/>
+              <a:t>Food Planner and Recommendation</a:t>
+            </a:r>
+            <a:br>
+              <a:rPr lang="en-US" dirty="0"/>
+            </a:br>
+            <a:r>
+              <a:rPr lang="en-US" dirty="0"/>
+              <a:t>Business Value</a:t>
+            </a:r>
+            <a:endParaRPr lang="en-SG" dirty="0"/>
+          </a:p>
+        </p:txBody>
+      </p:sp>
+      <p:sp>
+        <p:nvSpPr>
+          <p:cNvPr id="3" name="Content Placeholder 2"/>
+          <p:cNvSpPr>
+            <a:spLocks noGrp="1"/>
+          </p:cNvSpPr>
+          <p:nvPr>
+            <p:ph sz="quarter" idx="13"/>
+          </p:nvPr>
+        </p:nvSpPr>
+        <p:spPr>
+          <a:xfrm>
+            <a:off x="838200" y="1182208"/>
+            <a:ext cx="10515600" cy="5310667"/>
+          </a:xfrm>
+        </p:spPr>
+        <p:txBody>
+          <a:bodyPr>
+            <a:normAutofit/>
+          </a:bodyPr>
+          <a:lstStyle/>
+          <a:p>
+            <a:r>
+              <a:rPr lang="en-US" sz="2200" b="0">
+                <a:solidFill>
+                  <a:schemeClr val="accent1"/>
+                </a:solidFill>
+              </a:rPr>
+              <a:t>Potential application:</a:t>
+            </a:r>
+            <a:endParaRPr lang="en-US" sz="2200" b="0" dirty="0">
+              <a:solidFill>
+                <a:schemeClr val="accent1"/>
+              </a:solidFill>
+            </a:endParaRPr>
+          </a:p>
+          <a:p>
+            <a:pPr lvl="1"/>
+            <a:r>
+              <a:rPr lang="en-US" sz="1800" b="0" dirty="0">
+                <a:solidFill>
+                  <a:schemeClr val="accent1"/>
+                </a:solidFill>
+              </a:rPr>
+              <a:t>End user app </a:t>
+            </a:r>
+            <a:r>
+              <a:rPr lang="en-US" sz="1800" dirty="0">
+                <a:solidFill>
+                  <a:schemeClr val="accent1"/>
+                </a:solidFill>
+              </a:rPr>
+              <a:t>for </a:t>
+            </a:r>
+            <a:r>
+              <a:rPr lang="en-US" sz="1800" b="0" dirty="0">
+                <a:solidFill>
+                  <a:schemeClr val="accent1"/>
+                </a:solidFill>
+              </a:rPr>
+              <a:t>food database to give users ideas on how to plan their meal. </a:t>
+            </a:r>
+            <a:r>
+              <a:rPr lang="en-US" sz="1800" dirty="0">
+                <a:solidFill>
+                  <a:schemeClr val="accent1"/>
+                </a:solidFill>
+              </a:rPr>
+              <a:t>The app may incorporate advertisement to generate revenue to sustain the operation</a:t>
+            </a:r>
+          </a:p>
+          <a:p>
+            <a:pPr lvl="1"/>
+            <a:r>
+              <a:rPr lang="en-US" sz="1800" b="0" dirty="0">
+                <a:solidFill>
+                  <a:schemeClr val="accent1"/>
+                </a:solidFill>
+              </a:rPr>
+              <a:t>Serves as food database from various food vendors/restaurants. </a:t>
+            </a:r>
+            <a:r>
+              <a:rPr lang="en-US" sz="1800" dirty="0">
+                <a:solidFill>
+                  <a:schemeClr val="accent1"/>
+                </a:solidFill>
+              </a:rPr>
+              <a:t>It can be used as a platform to introduce their food to end users and potentially logic to boost the feature of some food from some premium customers</a:t>
+            </a:r>
+          </a:p>
+          <a:p>
+            <a:pPr lvl="1"/>
+            <a:r>
+              <a:rPr lang="en-US" sz="1800" dirty="0">
+                <a:solidFill>
+                  <a:schemeClr val="accent1"/>
+                </a:solidFill>
+              </a:rPr>
+              <a:t>It can be developed further as food diary for end users which can dynamically adjust the daily food intake based on weekly or monthly objective.</a:t>
+            </a:r>
+            <a:endParaRPr lang="en-US" sz="1800" b="0" dirty="0">
+              <a:solidFill>
+                <a:schemeClr val="accent1"/>
+              </a:solidFill>
+            </a:endParaRPr>
+          </a:p>
+          <a:p>
+            <a:pPr marL="357180" lvl="1" indent="0">
+              <a:buNone/>
+            </a:pPr>
+            <a:endParaRPr lang="en-SG" sz="1800" dirty="0">
+              <a:solidFill>
+                <a:schemeClr val="accent1"/>
+              </a:solidFill>
+            </a:endParaRPr>
+          </a:p>
+          <a:p>
+            <a:pPr marL="1319194" lvl="2" indent="-514350">
+              <a:buFont typeface="+mj-lt"/>
+              <a:buAutoNum type="arabicPeriod"/>
+            </a:pPr>
+            <a:endParaRPr lang="en-SG" sz="2200" dirty="0">
+              <a:solidFill>
+                <a:schemeClr val="accent1"/>
+              </a:solidFill>
+            </a:endParaRPr>
+          </a:p>
+          <a:p>
+            <a:endParaRPr lang="en-SG" sz="2200" b="0" dirty="0">
+              <a:solidFill>
+                <a:schemeClr val="accent1"/>
+              </a:solidFill>
+            </a:endParaRPr>
+          </a:p>
+        </p:txBody>
+      </p:sp>
+      <p:sp>
+        <p:nvSpPr>
+          <p:cNvPr id="5" name="Slide Number Placeholder 4"/>
+          <p:cNvSpPr>
+            <a:spLocks noGrp="1"/>
+          </p:cNvSpPr>
+          <p:nvPr>
+            <p:ph type="sldNum" sz="quarter" idx="16"/>
+          </p:nvPr>
+        </p:nvSpPr>
+        <p:spPr/>
+        <p:txBody>
+          <a:bodyPr/>
+          <a:lstStyle/>
+          <a:p>
+            <a:fld id="{2F63C605-4FC6-46DE-BC90-871762EA3F52}" type="slidenum">
+              <a:rPr lang="en-SG" smtClean="0"/>
+              <a:pPr/>
+              <a:t>6</a:t>
+            </a:fld>
+            <a:endParaRPr lang="en-SG" dirty="0"/>
+          </a:p>
+        </p:txBody>
+      </p:sp>
+      <p:sp>
+        <p:nvSpPr>
+          <p:cNvPr id="6" name="Footer Placeholder 7"/>
+          <p:cNvSpPr>
+            <a:spLocks noGrp="1"/>
+          </p:cNvSpPr>
+          <p:nvPr>
+            <p:ph type="ftr" sz="quarter" idx="15"/>
+          </p:nvPr>
+        </p:nvSpPr>
+        <p:spPr>
+          <a:xfrm>
+            <a:off x="7238446" y="6492875"/>
+            <a:ext cx="3872141" cy="365125"/>
+          </a:xfrm>
+        </p:spPr>
+        <p:txBody>
+          <a:bodyPr/>
+          <a:lstStyle/>
+          <a:p>
+            <a:pPr algn="l"/>
+            <a:r>
+              <a:rPr lang="en-SG" sz="1050" dirty="0"/>
+              <a:t>© 2020 National University of Singapore. All Rights Reserved</a:t>
+            </a:r>
+            <a:endParaRPr lang="en-SG" sz="1400" dirty="0"/>
+          </a:p>
+        </p:txBody>
+      </p:sp>
+    </p:spTree>
+    <p:extLst>
+      <p:ext uri="{BB962C8B-B14F-4D97-AF65-F5344CB8AC3E}">
+        <p14:creationId xmlns:p14="http://schemas.microsoft.com/office/powerpoint/2010/main" val="913536933"/>
+      </p:ext>
+    </p:extLst>
+  </p:cSld>
+  <p:clrMapOvr>
+    <a:masterClrMapping/>
+  </p:clrMapOvr>
+  <p:timing>
+    <p:tnLst>
+      <p:par>
+        <p:cTn id="1" dur="indefinite" restart="never" nodeType="tmRoot">
+          <p:childTnLst>
+            <p:seq concurrent="1" nextAc="seek">
+              <p:cTn id="2" dur="indefinite" nodeType="mainSeq">
+                <p:childTnLst>
+                  <p:par>
+                    <p:cTn id="3" fill="hold">
+                      <p:stCondLst>
+                        <p:cond delay="indefinite"/>
+                        <p:cond evt="onBegin" delay="0">
+                          <p:tn val="2"/>
+                        </p:cond>
+                      </p:stCondLst>
+                      <p:childTnLst>
+                        <p:par>
+                          <p:cTn id="4" fill="hold">
+                            <p:stCondLst>
+                              <p:cond delay="0"/>
+                            </p:stCondLst>
+                            <p:childTnLst>
+                              <p:par>
+                                <p:cTn id="5" presetID="42" presetClass="entr" presetSubtype="0" fill="hold" nodeType="afterEffect">
+                                  <p:stCondLst>
+                                    <p:cond delay="0"/>
+                                  </p:stCondLst>
+                                  <p:childTnLst>
+                                    <p:set>
+                                      <p:cBhvr>
+                                        <p:cTn id="6" dur="1" fill="hold">
+                                          <p:stCondLst>
+                                            <p:cond delay="0"/>
+                                          </p:stCondLst>
+                                        </p:cTn>
+                                        <p:tgtEl>
+                                          <p:spTgt spid="3">
+                                            <p:txEl>
+                                              <p:pRg st="0" end="0"/>
+                                            </p:txEl>
+                                          </p:spTgt>
+                                        </p:tgtEl>
+                                        <p:attrNameLst>
+                                          <p:attrName>style.visibility</p:attrName>
+                                        </p:attrNameLst>
+                                      </p:cBhvr>
+                                      <p:to>
+                                        <p:strVal val="visible"/>
+                                      </p:to>
+                                    </p:set>
+                                    <p:animEffect transition="in" filter="fade">
+                                      <p:cBhvr>
+                                        <p:cTn id="7" dur="1000"/>
+                                        <p:tgtEl>
+                                          <p:spTgt spid="3">
+                                            <p:txEl>
+                                              <p:pRg st="0" end="0"/>
+                                            </p:txEl>
+                                          </p:spTgt>
+                                        </p:tgtEl>
+                                      </p:cBhvr>
+                                    </p:animEffect>
+                                    <p:anim calcmode="lin" valueType="num">
+                                      <p:cBhvr>
+                                        <p:cTn id="8" dur="1000" fill="hold"/>
+                                        <p:tgtEl>
+                                          <p:spTgt spid="3">
+                                            <p:txEl>
+                                              <p:pRg st="0" end="0"/>
+                                            </p:txEl>
+                                          </p:spTgt>
+                                        </p:tgtEl>
+                                        <p:attrNameLst>
+                                          <p:attrName>ppt_x</p:attrName>
+                                        </p:attrNameLst>
+                                      </p:cBhvr>
+                                      <p:tavLst>
+                                        <p:tav tm="0">
+                                          <p:val>
+                                            <p:strVal val="#ppt_x"/>
+                                          </p:val>
+                                        </p:tav>
+                                        <p:tav tm="100000">
+                                          <p:val>
+                                            <p:strVal val="#ppt_x"/>
+                                          </p:val>
+                                        </p:tav>
+                                      </p:tavLst>
+                                    </p:anim>
+                                    <p:anim calcmode="lin" valueType="num">
+                                      <p:cBhvr>
+                                        <p:cTn id="9" dur="1000" fill="hold"/>
+                                        <p:tgtEl>
+                                          <p:spTgt spid="3">
+                                            <p:txEl>
+                                              <p:pRg st="0" end="0"/>
+                                            </p:txEl>
+                                          </p:spTgt>
+                                        </p:tgtEl>
+                                        <p:attrNameLst>
+                                          <p:attrName>ppt_y</p:attrName>
+                                        </p:attrNameLst>
+                                      </p:cBhvr>
+                                      <p:tavLst>
+                                        <p:tav tm="0">
+                                          <p:val>
+                                            <p:strVal val="#ppt_y+.1"/>
+                                          </p:val>
+                                        </p:tav>
+                                        <p:tav tm="100000">
+                                          <p:val>
+                                            <p:strVal val="#ppt_y"/>
+                                          </p:val>
+                                        </p:tav>
+                                      </p:tavLst>
+                                    </p:anim>
+                                  </p:childTnLst>
+                                </p:cTn>
+                              </p:par>
+                            </p:childTnLst>
+                          </p:cTn>
+                        </p:par>
+                        <p:par>
+                          <p:cTn id="10" fill="hold">
+                            <p:stCondLst>
+                              <p:cond delay="1000"/>
+                            </p:stCondLst>
+                            <p:childTnLst>
+                              <p:par>
+                                <p:cTn id="11" presetID="42" presetClass="entr" presetSubtype="0" fill="hold" nodeType="afterEffect">
+                                  <p:stCondLst>
+                                    <p:cond delay="0"/>
+                                  </p:stCondLst>
+                                  <p:childTnLst>
+                                    <p:set>
+                                      <p:cBhvr>
+                                        <p:cTn id="12" dur="1" fill="hold">
+                                          <p:stCondLst>
+                                            <p:cond delay="0"/>
+                                          </p:stCondLst>
+                                        </p:cTn>
+                                        <p:tgtEl>
+                                          <p:spTgt spid="3">
+                                            <p:txEl>
+                                              <p:pRg st="1" end="1"/>
+                                            </p:txEl>
+                                          </p:spTgt>
+                                        </p:tgtEl>
+                                        <p:attrNameLst>
+                                          <p:attrName>style.visibility</p:attrName>
+                                        </p:attrNameLst>
+                                      </p:cBhvr>
+                                      <p:to>
+                                        <p:strVal val="visible"/>
+                                      </p:to>
+                                    </p:set>
+                                    <p:animEffect transition="in" filter="fade">
+                                      <p:cBhvr>
+                                        <p:cTn id="13" dur="1000"/>
+                                        <p:tgtEl>
+                                          <p:spTgt spid="3">
+                                            <p:txEl>
+                                              <p:pRg st="1" end="1"/>
+                                            </p:txEl>
+                                          </p:spTgt>
+                                        </p:tgtEl>
+                                      </p:cBhvr>
+                                    </p:animEffect>
+                                    <p:anim calcmode="lin" valueType="num">
+                                      <p:cBhvr>
+                                        <p:cTn id="14" dur="1000" fill="hold"/>
+                                        <p:tgtEl>
+                                          <p:spTgt spid="3">
+                                            <p:txEl>
+                                              <p:pRg st="1" end="1"/>
+                                            </p:txEl>
+                                          </p:spTgt>
+                                        </p:tgtEl>
+                                        <p:attrNameLst>
+                                          <p:attrName>ppt_x</p:attrName>
+                                        </p:attrNameLst>
+                                      </p:cBhvr>
+                                      <p:tavLst>
+                                        <p:tav tm="0">
+                                          <p:val>
+                                            <p:strVal val="#ppt_x"/>
+                                          </p:val>
+                                        </p:tav>
+                                        <p:tav tm="100000">
+                                          <p:val>
+                                            <p:strVal val="#ppt_x"/>
+                                          </p:val>
+                                        </p:tav>
+                                      </p:tavLst>
+                                    </p:anim>
+                                    <p:anim calcmode="lin" valueType="num">
+                                      <p:cBhvr>
+                                        <p:cTn id="15" dur="1000" fill="hold"/>
+                                        <p:tgtEl>
+                                          <p:spTgt spid="3">
+                                            <p:txEl>
+                                              <p:pRg st="1" end="1"/>
+                                            </p:txEl>
+                                          </p:spTgt>
+                                        </p:tgtEl>
+                                        <p:attrNameLst>
+                                          <p:attrName>ppt_y</p:attrName>
+                                        </p:attrNameLst>
+                                      </p:cBhvr>
+                                      <p:tavLst>
+                                        <p:tav tm="0">
+                                          <p:val>
+                                            <p:strVal val="#ppt_y+.1"/>
+                                          </p:val>
+                                        </p:tav>
+                                        <p:tav tm="100000">
+                                          <p:val>
+                                            <p:strVal val="#ppt_y"/>
+                                          </p:val>
+                                        </p:tav>
+                                      </p:tavLst>
+                                    </p:anim>
+                                  </p:childTnLst>
+                                </p:cTn>
+                              </p:par>
+                            </p:childTnLst>
+                          </p:cTn>
+                        </p:par>
+                        <p:par>
+                          <p:cTn id="16" fill="hold">
+                            <p:stCondLst>
+                              <p:cond delay="2000"/>
+                            </p:stCondLst>
+                            <p:childTnLst>
+                              <p:par>
+                                <p:cTn id="17" presetID="42" presetClass="entr" presetSubtype="0" fill="hold" nodeType="afterEffect">
+                                  <p:stCondLst>
+                                    <p:cond delay="0"/>
+                                  </p:stCondLst>
+                                  <p:childTnLst>
+                                    <p:set>
+                                      <p:cBhvr>
+                                        <p:cTn id="18" dur="1" fill="hold">
+                                          <p:stCondLst>
+                                            <p:cond delay="0"/>
+                                          </p:stCondLst>
+                                        </p:cTn>
+                                        <p:tgtEl>
+                                          <p:spTgt spid="3">
+                                            <p:txEl>
+                                              <p:pRg st="2" end="2"/>
+                                            </p:txEl>
+                                          </p:spTgt>
+                                        </p:tgtEl>
+                                        <p:attrNameLst>
+                                          <p:attrName>style.visibility</p:attrName>
+                                        </p:attrNameLst>
+                                      </p:cBhvr>
+                                      <p:to>
+                                        <p:strVal val="visible"/>
+                                      </p:to>
+                                    </p:set>
+                                    <p:animEffect transition="in" filter="fade">
+                                      <p:cBhvr>
+                                        <p:cTn id="19" dur="1000"/>
+                                        <p:tgtEl>
+                                          <p:spTgt spid="3">
+                                            <p:txEl>
+                                              <p:pRg st="2" end="2"/>
+                                            </p:txEl>
+                                          </p:spTgt>
+                                        </p:tgtEl>
+                                      </p:cBhvr>
+                                    </p:animEffect>
+                                    <p:anim calcmode="lin" valueType="num">
+                                      <p:cBhvr>
+                                        <p:cTn id="20" dur="1000" fill="hold"/>
+                                        <p:tgtEl>
+                                          <p:spTgt spid="3">
+                                            <p:txEl>
+                                              <p:pRg st="2" end="2"/>
+                                            </p:txEl>
+                                          </p:spTgt>
+                                        </p:tgtEl>
+                                        <p:attrNameLst>
+                                          <p:attrName>ppt_x</p:attrName>
+                                        </p:attrNameLst>
+                                      </p:cBhvr>
+                                      <p:tavLst>
+                                        <p:tav tm="0">
+                                          <p:val>
+                                            <p:strVal val="#ppt_x"/>
+                                          </p:val>
+                                        </p:tav>
+                                        <p:tav tm="100000">
+                                          <p:val>
+                                            <p:strVal val="#ppt_x"/>
+                                          </p:val>
+                                        </p:tav>
+                                      </p:tavLst>
+                                    </p:anim>
+                                    <p:anim calcmode="lin" valueType="num">
+                                      <p:cBhvr>
+                                        <p:cTn id="21" dur="1000" fill="hold"/>
+                                        <p:tgtEl>
+                                          <p:spTgt spid="3">
+                                            <p:txEl>
+                                              <p:pRg st="2" end="2"/>
+                                            </p:txEl>
+                                          </p:spTgt>
+                                        </p:tgtEl>
+                                        <p:attrNameLst>
+                                          <p:attrName>ppt_y</p:attrName>
+                                        </p:attrNameLst>
+                                      </p:cBhvr>
+                                      <p:tavLst>
+                                        <p:tav tm="0">
+                                          <p:val>
+                                            <p:strVal val="#ppt_y+.1"/>
+                                          </p:val>
+                                        </p:tav>
+                                        <p:tav tm="100000">
+                                          <p:val>
+                                            <p:strVal val="#ppt_y"/>
+                                          </p:val>
+                                        </p:tav>
+                                      </p:tavLst>
+                                    </p:anim>
+                                  </p:childTnLst>
+                                </p:cTn>
+                              </p:par>
+                            </p:childTnLst>
+                          </p:cTn>
+                        </p:par>
+                        <p:par>
+                          <p:cTn id="22" fill="hold">
+                            <p:stCondLst>
+                              <p:cond delay="3000"/>
+                            </p:stCondLst>
+                            <p:childTnLst>
+                              <p:par>
+                                <p:cTn id="23" presetID="42" presetClass="entr" presetSubtype="0" fill="hold" nodeType="afterEffect">
+                                  <p:stCondLst>
+                                    <p:cond delay="0"/>
+                                  </p:stCondLst>
+                                  <p:childTnLst>
+                                    <p:set>
+                                      <p:cBhvr>
+                                        <p:cTn id="24" dur="1" fill="hold">
+                                          <p:stCondLst>
+                                            <p:cond delay="0"/>
+                                          </p:stCondLst>
+                                        </p:cTn>
+                                        <p:tgtEl>
+                                          <p:spTgt spid="3">
+                                            <p:txEl>
+                                              <p:pRg st="3" end="3"/>
+                                            </p:txEl>
+                                          </p:spTgt>
+                                        </p:tgtEl>
+                                        <p:attrNameLst>
+                                          <p:attrName>style.visibility</p:attrName>
+                                        </p:attrNameLst>
+                                      </p:cBhvr>
+                                      <p:to>
+                                        <p:strVal val="visible"/>
+                                      </p:to>
+                                    </p:set>
+                                    <p:animEffect transition="in" filter="fade">
+                                      <p:cBhvr>
+                                        <p:cTn id="25" dur="1000"/>
+                                        <p:tgtEl>
+                                          <p:spTgt spid="3">
+                                            <p:txEl>
+                                              <p:pRg st="3" end="3"/>
+                                            </p:txEl>
+                                          </p:spTgt>
+                                        </p:tgtEl>
+                                      </p:cBhvr>
+                                    </p:animEffect>
+                                    <p:anim calcmode="lin" valueType="num">
+                                      <p:cBhvr>
+                                        <p:cTn id="26" dur="1000" fill="hold"/>
+                                        <p:tgtEl>
+                                          <p:spTgt spid="3">
+                                            <p:txEl>
+                                              <p:pRg st="3" end="3"/>
+                                            </p:txEl>
+                                          </p:spTgt>
+                                        </p:tgtEl>
+                                        <p:attrNameLst>
+                                          <p:attrName>ppt_x</p:attrName>
+                                        </p:attrNameLst>
+                                      </p:cBhvr>
+                                      <p:tavLst>
+                                        <p:tav tm="0">
+                                          <p:val>
+                                            <p:strVal val="#ppt_x"/>
+                                          </p:val>
+                                        </p:tav>
+                                        <p:tav tm="100000">
+                                          <p:val>
+                                            <p:strVal val="#ppt_x"/>
+                                          </p:val>
+                                        </p:tav>
+                                      </p:tavLst>
+                                    </p:anim>
+                                    <p:anim calcmode="lin" valueType="num">
+                                      <p:cBhvr>
+                                        <p:cTn id="27" dur="1000" fill="hold"/>
+                                        <p:tgtEl>
+                                          <p:spTgt spid="3">
+                                            <p:txEl>
+                                              <p:pRg st="3" end="3"/>
                                             </p:txEl>
                                           </p:spTgt>
                                         </p:tgtEl>

</xml_diff>